<commit_message>
Finished draft of activity
</commit_message>
<xml_diff>
--- a/Resources/ProteinGuide.pptx
+++ b/Resources/ProteinGuide.pptx
@@ -7,12 +7,13 @@
   <p:sldIdLst>
     <p:sldId id="263" r:id="rId2"/>
     <p:sldId id="257" r:id="rId3"/>
-    <p:sldId id="258" r:id="rId4"/>
-    <p:sldId id="259" r:id="rId5"/>
-    <p:sldId id="262" r:id="rId6"/>
-    <p:sldId id="256" r:id="rId7"/>
-    <p:sldId id="261" r:id="rId8"/>
-    <p:sldId id="260" r:id="rId9"/>
+    <p:sldId id="264" r:id="rId4"/>
+    <p:sldId id="258" r:id="rId5"/>
+    <p:sldId id="259" r:id="rId6"/>
+    <p:sldId id="262" r:id="rId7"/>
+    <p:sldId id="256" r:id="rId8"/>
+    <p:sldId id="261" r:id="rId9"/>
+    <p:sldId id="260" r:id="rId10"/>
   </p:sldIdLst>
   <p:sldSz cx="12192000" cy="6858000"/>
   <p:notesSz cx="6858000" cy="9144000"/>
@@ -118,6 +119,7 @@
           <p14:sldIdLst>
             <p14:sldId id="263"/>
             <p14:sldId id="257"/>
+            <p14:sldId id="264"/>
             <p14:sldId id="258"/>
             <p14:sldId id="259"/>
             <p14:sldId id="262"/>
@@ -3184,6 +3186,106 @@
       </p:grpSpPr>
       <p:pic>
         <p:nvPicPr>
+          <p:cNvPr id="3" name="Picture 2">
+            <a:extLst>
+              <a:ext uri="{FF2B5EF4-FFF2-40B4-BE49-F238E27FC236}">
+                <a16:creationId xmlns:a16="http://schemas.microsoft.com/office/drawing/2014/main" id="{93541BCE-4AB7-487E-B562-B4EABBC61213}"/>
+              </a:ext>
+            </a:extLst>
+          </p:cNvPr>
+          <p:cNvPicPr>
+            <a:picLocks noChangeAspect="1"/>
+          </p:cNvPicPr>
+          <p:nvPr/>
+        </p:nvPicPr>
+        <p:blipFill>
+          <a:blip r:embed="rId2">
+            <a:extLst>
+              <a:ext uri="{28A0092B-C50C-407E-A947-70E740481C1C}">
+                <a14:useLocalDpi xmlns:a14="http://schemas.microsoft.com/office/drawing/2010/main" val="0"/>
+              </a:ext>
+            </a:extLst>
+          </a:blip>
+          <a:srcRect/>
+          <a:stretch/>
+        </p:blipFill>
+        <p:spPr>
+          <a:xfrm>
+            <a:off x="320040" y="988887"/>
+            <a:ext cx="5464456" cy="4880226"/>
+          </a:xfrm>
+          <a:prstGeom prst="rect">
+            <a:avLst/>
+          </a:prstGeom>
+        </p:spPr>
+      </p:pic>
+      <p:pic>
+        <p:nvPicPr>
+          <p:cNvPr id="9" name="Picture 8">
+            <a:extLst>
+              <a:ext uri="{FF2B5EF4-FFF2-40B4-BE49-F238E27FC236}">
+                <a16:creationId xmlns:a16="http://schemas.microsoft.com/office/drawing/2014/main" id="{FCB3D9A8-54CC-480B-8007-8FB9D6DD3A52}"/>
+              </a:ext>
+            </a:extLst>
+          </p:cNvPr>
+          <p:cNvPicPr>
+            <a:picLocks noChangeAspect="1"/>
+          </p:cNvPicPr>
+          <p:nvPr/>
+        </p:nvPicPr>
+        <p:blipFill>
+          <a:blip r:embed="rId3">
+            <a:extLst>
+              <a:ext uri="{28A0092B-C50C-407E-A947-70E740481C1C}">
+                <a14:useLocalDpi xmlns:a14="http://schemas.microsoft.com/office/drawing/2010/main" val="0"/>
+              </a:ext>
+            </a:extLst>
+          </a:blip>
+          <a:srcRect/>
+          <a:stretch/>
+        </p:blipFill>
+        <p:spPr>
+          <a:xfrm>
+            <a:off x="6470617" y="349251"/>
+            <a:ext cx="5338233" cy="6159498"/>
+          </a:xfrm>
+          <a:prstGeom prst="rect">
+            <a:avLst/>
+          </a:prstGeom>
+        </p:spPr>
+      </p:pic>
+    </p:spTree>
+    <p:extLst>
+      <p:ext uri="{BB962C8B-B14F-4D97-AF65-F5344CB8AC3E}">
+        <p14:creationId xmlns:p14="http://schemas.microsoft.com/office/powerpoint/2010/main" val="1081151120"/>
+      </p:ext>
+    </p:extLst>
+  </p:cSld>
+  <p:clrMapOvr>
+    <a:masterClrMapping/>
+  </p:clrMapOvr>
+</p:sld>
+</file>
+
+<file path=ppt/slides/slide4.xml><?xml version="1.0" encoding="utf-8"?>
+<p:sld xmlns:a="http://schemas.openxmlformats.org/drawingml/2006/main" xmlns:r="http://schemas.openxmlformats.org/officeDocument/2006/relationships" xmlns:p="http://schemas.openxmlformats.org/presentationml/2006/main">
+  <p:cSld>
+    <p:spTree>
+      <p:nvGrpSpPr>
+        <p:cNvPr id="1" name=""/>
+        <p:cNvGrpSpPr/>
+        <p:nvPr/>
+      </p:nvGrpSpPr>
+      <p:grpSpPr>
+        <a:xfrm>
+          <a:off x="0" y="0"/>
+          <a:ext cx="0" cy="0"/>
+          <a:chOff x="0" y="0"/>
+          <a:chExt cx="0" cy="0"/>
+        </a:xfrm>
+      </p:grpSpPr>
+      <p:pic>
+        <p:nvPicPr>
           <p:cNvPr id="3" name="Picture 2" descr="A screenshot of a cell phone&#10;&#10;Description automatically generated">
             <a:extLst>
               <a:ext uri="{FF2B5EF4-FFF2-40B4-BE49-F238E27FC236}">
@@ -3266,7 +3368,7 @@
 </p:sld>
 </file>
 
-<file path=ppt/slides/slide4.xml><?xml version="1.0" encoding="utf-8"?>
+<file path=ppt/slides/slide5.xml><?xml version="1.0" encoding="utf-8"?>
 <p:sld xmlns:a="http://schemas.openxmlformats.org/drawingml/2006/main" xmlns:r="http://schemas.openxmlformats.org/officeDocument/2006/relationships" xmlns:p="http://schemas.openxmlformats.org/presentationml/2006/main">
   <p:cSld>
     <p:spTree>
@@ -3367,7 +3469,7 @@
 </p:sld>
 </file>
 
-<file path=ppt/slides/slide5.xml><?xml version="1.0" encoding="utf-8"?>
+<file path=ppt/slides/slide6.xml><?xml version="1.0" encoding="utf-8"?>
 <p:sld xmlns:a="http://schemas.openxmlformats.org/drawingml/2006/main" xmlns:r="http://schemas.openxmlformats.org/officeDocument/2006/relationships" xmlns:p="http://schemas.openxmlformats.org/presentationml/2006/main">
   <p:cSld>
     <p:spTree>
@@ -3468,7 +3570,7 @@
 </p:sld>
 </file>
 
-<file path=ppt/slides/slide6.xml><?xml version="1.0" encoding="utf-8"?>
+<file path=ppt/slides/slide7.xml><?xml version="1.0" encoding="utf-8"?>
 <p:sld xmlns:a="http://schemas.openxmlformats.org/drawingml/2006/main" xmlns:r="http://schemas.openxmlformats.org/officeDocument/2006/relationships" xmlns:p="http://schemas.openxmlformats.org/presentationml/2006/main">
   <p:cSld>
     <p:bg>
@@ -3577,7 +3679,7 @@
 </p:sld>
 </file>
 
-<file path=ppt/slides/slide7.xml><?xml version="1.0" encoding="utf-8"?>
+<file path=ppt/slides/slide8.xml><?xml version="1.0" encoding="utf-8"?>
 <p:sld xmlns:a="http://schemas.openxmlformats.org/drawingml/2006/main" xmlns:r="http://schemas.openxmlformats.org/officeDocument/2006/relationships" xmlns:p="http://schemas.openxmlformats.org/presentationml/2006/main">
   <p:cSld>
     <p:spTree>
@@ -3678,7 +3780,7 @@
 </p:sld>
 </file>
 
-<file path=ppt/slides/slide8.xml><?xml version="1.0" encoding="utf-8"?>
+<file path=ppt/slides/slide9.xml><?xml version="1.0" encoding="utf-8"?>
 <p:sld xmlns:a="http://schemas.openxmlformats.org/drawingml/2006/main" xmlns:r="http://schemas.openxmlformats.org/officeDocument/2006/relationships" xmlns:p="http://schemas.openxmlformats.org/presentationml/2006/main">
   <p:cSld>
     <p:spTree>

</xml_diff>